<commit_message>
modify the ppt content
</commit_message>
<xml_diff>
--- a/Presentation_Build_2.pptx
+++ b/Presentation_Build_2.pptx
@@ -108,6 +108,11 @@
       </a:defRPr>
     </a:lvl9pPr>
   </p:defaultTextStyle>
+  <p:extLst>
+    <p:ext uri="{EFAFB233-063F-42B5-8137-9DF3F51BA10A}">
+      <p15:sldGuideLst xmlns:p15="http://schemas.microsoft.com/office/powerpoint/2012/main"/>
+    </p:ext>
+  </p:extLst>
 </p:presentation>
 </file>
 
@@ -299,7 +304,7 @@
           <a:p>
             <a:fld id="{95CA13F2-573C-8A46-A38C-D5204AF24056}" type="datetimeFigureOut">
               <a:rPr lang="en-US" smtClean="0"/>
-              <a:t>3/14/16</a:t>
+              <a:t>3/15/16</a:t>
             </a:fld>
             <a:endParaRPr lang="en-US"/>
           </a:p>
@@ -637,7 +642,7 @@
           <a:p>
             <a:fld id="{95CA13F2-573C-8A46-A38C-D5204AF24056}" type="datetimeFigureOut">
               <a:rPr lang="en-US" smtClean="0"/>
-              <a:t>3/14/16</a:t>
+              <a:t>3/15/16</a:t>
             </a:fld>
             <a:endParaRPr lang="en-US"/>
           </a:p>
@@ -1038,7 +1043,7 @@
           <a:p>
             <a:fld id="{95CA13F2-573C-8A46-A38C-D5204AF24056}" type="datetimeFigureOut">
               <a:rPr lang="en-US" smtClean="0"/>
-              <a:t>3/14/16</a:t>
+              <a:t>3/15/16</a:t>
             </a:fld>
             <a:endParaRPr lang="en-US"/>
           </a:p>
@@ -1374,7 +1379,7 @@
           <a:p>
             <a:fld id="{95CA13F2-573C-8A46-A38C-D5204AF24056}" type="datetimeFigureOut">
               <a:rPr lang="en-US" smtClean="0"/>
-              <a:t>3/14/16</a:t>
+              <a:t>3/15/16</a:t>
             </a:fld>
             <a:endParaRPr lang="en-US"/>
           </a:p>
@@ -1694,7 +1699,7 @@
           <a:p>
             <a:fld id="{95CA13F2-573C-8A46-A38C-D5204AF24056}" type="datetimeFigureOut">
               <a:rPr lang="en-US" smtClean="0"/>
-              <a:t>3/14/16</a:t>
+              <a:t>3/15/16</a:t>
             </a:fld>
             <a:endParaRPr lang="en-US"/>
           </a:p>
@@ -2090,7 +2095,7 @@
           <a:p>
             <a:fld id="{95CA13F2-573C-8A46-A38C-D5204AF24056}" type="datetimeFigureOut">
               <a:rPr lang="en-US" smtClean="0"/>
-              <a:t>3/14/16</a:t>
+              <a:t>3/15/16</a:t>
             </a:fld>
             <a:endParaRPr lang="en-US"/>
           </a:p>
@@ -2347,7 +2352,7 @@
           <a:p>
             <a:fld id="{95CA13F2-573C-8A46-A38C-D5204AF24056}" type="datetimeFigureOut">
               <a:rPr lang="en-US" smtClean="0"/>
-              <a:t>3/14/16</a:t>
+              <a:t>3/15/16</a:t>
             </a:fld>
             <a:endParaRPr lang="en-US"/>
           </a:p>
@@ -2609,7 +2614,7 @@
           <a:p>
             <a:fld id="{95CA13F2-573C-8A46-A38C-D5204AF24056}" type="datetimeFigureOut">
               <a:rPr lang="en-US" smtClean="0"/>
-              <a:t>3/14/16</a:t>
+              <a:t>3/15/16</a:t>
             </a:fld>
             <a:endParaRPr lang="en-US"/>
           </a:p>
@@ -2871,7 +2876,7 @@
           <a:p>
             <a:fld id="{95CA13F2-573C-8A46-A38C-D5204AF24056}" type="datetimeFigureOut">
               <a:rPr lang="en-US" smtClean="0"/>
-              <a:t>3/14/16</a:t>
+              <a:t>3/15/16</a:t>
             </a:fld>
             <a:endParaRPr lang="en-US"/>
           </a:p>
@@ -3200,7 +3205,7 @@
           <a:p>
             <a:fld id="{95CA13F2-573C-8A46-A38C-D5204AF24056}" type="datetimeFigureOut">
               <a:rPr lang="en-US" smtClean="0"/>
-              <a:t>3/14/16</a:t>
+              <a:t>3/15/16</a:t>
             </a:fld>
             <a:endParaRPr lang="en-US"/>
           </a:p>
@@ -3523,7 +3528,7 @@
           <a:p>
             <a:fld id="{95CA13F2-573C-8A46-A38C-D5204AF24056}" type="datetimeFigureOut">
               <a:rPr lang="en-US" smtClean="0"/>
-              <a:t>3/14/16</a:t>
+              <a:t>3/15/16</a:t>
             </a:fld>
             <a:endParaRPr lang="en-US"/>
           </a:p>
@@ -3980,7 +3985,7 @@
           <a:p>
             <a:fld id="{95CA13F2-573C-8A46-A38C-D5204AF24056}" type="datetimeFigureOut">
               <a:rPr lang="en-US" smtClean="0"/>
-              <a:t>3/14/16</a:t>
+              <a:t>3/15/16</a:t>
             </a:fld>
             <a:endParaRPr lang="en-US"/>
           </a:p>
@@ -4185,7 +4190,7 @@
           <a:p>
             <a:fld id="{95CA13F2-573C-8A46-A38C-D5204AF24056}" type="datetimeFigureOut">
               <a:rPr lang="en-US" smtClean="0"/>
-              <a:t>3/14/16</a:t>
+              <a:t>3/15/16</a:t>
             </a:fld>
             <a:endParaRPr lang="en-US"/>
           </a:p>
@@ -4362,7 +4367,7 @@
           <a:p>
             <a:fld id="{95CA13F2-573C-8A46-A38C-D5204AF24056}" type="datetimeFigureOut">
               <a:rPr lang="en-US" smtClean="0"/>
-              <a:t>3/14/16</a:t>
+              <a:t>3/15/16</a:t>
             </a:fld>
             <a:endParaRPr lang="en-US"/>
           </a:p>
@@ -4695,7 +4700,7 @@
           <a:p>
             <a:fld id="{95CA13F2-573C-8A46-A38C-D5204AF24056}" type="datetimeFigureOut">
               <a:rPr lang="en-US" smtClean="0"/>
-              <a:t>3/14/16</a:t>
+              <a:t>3/15/16</a:t>
             </a:fld>
             <a:endParaRPr lang="en-US"/>
           </a:p>
@@ -5040,7 +5045,7 @@
           <a:p>
             <a:fld id="{95CA13F2-573C-8A46-A38C-D5204AF24056}" type="datetimeFigureOut">
               <a:rPr lang="en-US" smtClean="0"/>
-              <a:t>3/14/16</a:t>
+              <a:t>3/15/16</a:t>
             </a:fld>
             <a:endParaRPr lang="en-US"/>
           </a:p>
@@ -7157,7 +7162,7 @@
           <a:p>
             <a:fld id="{95CA13F2-573C-8A46-A38C-D5204AF24056}" type="datetimeFigureOut">
               <a:rPr lang="en-US" smtClean="0"/>
-              <a:t>3/14/16</a:t>
+              <a:t>3/15/16</a:t>
             </a:fld>
             <a:endParaRPr lang="en-US"/>
           </a:p>
@@ -8073,6 +8078,10 @@
           <a:bodyPr/>
           <a:lstStyle/>
           <a:p>
+            <a:r>
+              <a:rPr lang="en-US" smtClean="0"/>
+              <a:t>First singleton</a:t>
+            </a:r>
             <a:endParaRPr lang="en-US" dirty="0"/>
           </a:p>
         </p:txBody>

</xml_diff>